<commit_message>
edit helpWindow size and cheatSheet contents
</commit_message>
<xml_diff>
--- a/docs/diagrams/CheatSheet.pptx
+++ b/docs/diagrams/CheatSheet.pptx
@@ -104,6 +104,11 @@
       </a:defRPr>
     </a:lvl9pPr>
   </p:defaultTextStyle>
+  <p:extLst>
+    <p:ext uri="{EFAFB233-063F-42B5-8137-9DF3F51BA10A}">
+      <p15:sldGuideLst xmlns:p15="http://schemas.microsoft.com/office/powerpoint/2012/main"/>
+    </p:ext>
+  </p:extLst>
 </p:presentation>
 </file>
 
@@ -238,7 +243,7 @@
           <a:p>
             <a:fld id="{1D56059B-881F-4F87-B106-E7DB2E4D2446}" type="datetimeFigureOut">
               <a:rPr lang="en-SG" smtClean="0"/>
-              <a:t>31/10/2016</a:t>
+              <a:t>6/11/2016</a:t>
             </a:fld>
             <a:endParaRPr lang="en-SG"/>
           </a:p>
@@ -408,7 +413,7 @@
           <a:p>
             <a:fld id="{1D56059B-881F-4F87-B106-E7DB2E4D2446}" type="datetimeFigureOut">
               <a:rPr lang="en-SG" smtClean="0"/>
-              <a:t>31/10/2016</a:t>
+              <a:t>6/11/2016</a:t>
             </a:fld>
             <a:endParaRPr lang="en-SG"/>
           </a:p>
@@ -588,7 +593,7 @@
           <a:p>
             <a:fld id="{1D56059B-881F-4F87-B106-E7DB2E4D2446}" type="datetimeFigureOut">
               <a:rPr lang="en-SG" smtClean="0"/>
-              <a:t>31/10/2016</a:t>
+              <a:t>6/11/2016</a:t>
             </a:fld>
             <a:endParaRPr lang="en-SG"/>
           </a:p>
@@ -758,7 +763,7 @@
           <a:p>
             <a:fld id="{1D56059B-881F-4F87-B106-E7DB2E4D2446}" type="datetimeFigureOut">
               <a:rPr lang="en-SG" smtClean="0"/>
-              <a:t>31/10/2016</a:t>
+              <a:t>6/11/2016</a:t>
             </a:fld>
             <a:endParaRPr lang="en-SG"/>
           </a:p>
@@ -1004,7 +1009,7 @@
           <a:p>
             <a:fld id="{1D56059B-881F-4F87-B106-E7DB2E4D2446}" type="datetimeFigureOut">
               <a:rPr lang="en-SG" smtClean="0"/>
-              <a:t>31/10/2016</a:t>
+              <a:t>6/11/2016</a:t>
             </a:fld>
             <a:endParaRPr lang="en-SG"/>
           </a:p>
@@ -1236,7 +1241,7 @@
           <a:p>
             <a:fld id="{1D56059B-881F-4F87-B106-E7DB2E4D2446}" type="datetimeFigureOut">
               <a:rPr lang="en-SG" smtClean="0"/>
-              <a:t>31/10/2016</a:t>
+              <a:t>6/11/2016</a:t>
             </a:fld>
             <a:endParaRPr lang="en-SG"/>
           </a:p>
@@ -1603,7 +1608,7 @@
           <a:p>
             <a:fld id="{1D56059B-881F-4F87-B106-E7DB2E4D2446}" type="datetimeFigureOut">
               <a:rPr lang="en-SG" smtClean="0"/>
-              <a:t>31/10/2016</a:t>
+              <a:t>6/11/2016</a:t>
             </a:fld>
             <a:endParaRPr lang="en-SG"/>
           </a:p>
@@ -1721,7 +1726,7 @@
           <a:p>
             <a:fld id="{1D56059B-881F-4F87-B106-E7DB2E4D2446}" type="datetimeFigureOut">
               <a:rPr lang="en-SG" smtClean="0"/>
-              <a:t>31/10/2016</a:t>
+              <a:t>6/11/2016</a:t>
             </a:fld>
             <a:endParaRPr lang="en-SG"/>
           </a:p>
@@ -1816,7 +1821,7 @@
           <a:p>
             <a:fld id="{1D56059B-881F-4F87-B106-E7DB2E4D2446}" type="datetimeFigureOut">
               <a:rPr lang="en-SG" smtClean="0"/>
-              <a:t>31/10/2016</a:t>
+              <a:t>6/11/2016</a:t>
             </a:fld>
             <a:endParaRPr lang="en-SG"/>
           </a:p>
@@ -2093,7 +2098,7 @@
           <a:p>
             <a:fld id="{1D56059B-881F-4F87-B106-E7DB2E4D2446}" type="datetimeFigureOut">
               <a:rPr lang="en-SG" smtClean="0"/>
-              <a:t>31/10/2016</a:t>
+              <a:t>6/11/2016</a:t>
             </a:fld>
             <a:endParaRPr lang="en-SG"/>
           </a:p>
@@ -2346,7 +2351,7 @@
           <a:p>
             <a:fld id="{1D56059B-881F-4F87-B106-E7DB2E4D2446}" type="datetimeFigureOut">
               <a:rPr lang="en-SG" smtClean="0"/>
-              <a:t>31/10/2016</a:t>
+              <a:t>6/11/2016</a:t>
             </a:fld>
             <a:endParaRPr lang="en-SG"/>
           </a:p>
@@ -2559,7 +2564,7 @@
           <a:p>
             <a:fld id="{1D56059B-881F-4F87-B106-E7DB2E4D2446}" type="datetimeFigureOut">
               <a:rPr lang="en-SG" smtClean="0"/>
-              <a:t>31/10/2016</a:t>
+              <a:t>6/11/2016</a:t>
             </a:fld>
             <a:endParaRPr lang="en-SG"/>
           </a:p>
@@ -2973,14 +2978,14 @@
           <p:nvPr>
             <p:extLst>
               <p:ext uri="{D42A27DB-BD31-4B8C-83A1-F6EECF244321}">
-                <p14:modId xmlns:p14="http://schemas.microsoft.com/office/powerpoint/2010/main" val="3062323649"/>
+                <p14:modId xmlns:p14="http://schemas.microsoft.com/office/powerpoint/2010/main" val="2629937129"/>
               </p:ext>
             </p:extLst>
           </p:nvPr>
         </p:nvGraphicFramePr>
         <p:xfrm>
-          <a:off x="1" y="-1941093"/>
-          <a:ext cx="12191999" cy="10888962"/>
+          <a:off x="-133349" y="-1960143"/>
+          <a:ext cx="12325349" cy="11943517"/>
         </p:xfrm>
         <a:graphic>
           <a:graphicData uri="http://schemas.openxmlformats.org/drawingml/2006/table">
@@ -2989,21 +2994,21 @@
                 <a:tableStyleId>{5C22544A-7EE6-4342-B048-85BDC9FD1C3A}</a:tableStyleId>
               </a:tblPr>
               <a:tblGrid>
-                <a:gridCol w="2133362">
+                <a:gridCol w="2156696">
                   <a:extLst>
                     <a:ext uri="{9D8B030D-6E8A-4147-A177-3AD203B41FA5}">
                       <a16:colId xmlns:a16="http://schemas.microsoft.com/office/drawing/2014/main" val="1187591333"/>
                     </a:ext>
                   </a:extLst>
                 </a:gridCol>
-                <a:gridCol w="7192328">
+                <a:gridCol w="7270994">
                   <a:extLst>
                     <a:ext uri="{9D8B030D-6E8A-4147-A177-3AD203B41FA5}">
                       <a16:colId xmlns:a16="http://schemas.microsoft.com/office/drawing/2014/main" val="2997910900"/>
                     </a:ext>
                   </a:extLst>
                 </a:gridCol>
-                <a:gridCol w="2866309">
+                <a:gridCol w="2897659">
                   <a:extLst>
                     <a:ext uri="{9D8B030D-6E8A-4147-A177-3AD203B41FA5}">
                       <a16:colId xmlns:a16="http://schemas.microsoft.com/office/drawing/2014/main" val="4102137958"/>
@@ -3011,7 +3016,7 @@
                   </a:extLst>
                 </a:gridCol>
               </a:tblGrid>
-              <a:tr h="866272">
+              <a:tr h="840128">
                 <a:tc>
                   <a:txBody>
                     <a:bodyPr/>
@@ -3072,7 +3077,7 @@
                   </a:ext>
                 </a:extLst>
               </a:tr>
-              <a:tr h="426500">
+              <a:tr h="639967">
                 <a:tc rowSpan="3">
                   <a:txBody>
                     <a:bodyPr/>
@@ -3191,11 +3196,6 @@
                         </a:rPr>
                         <a:t>hawker food</a:t>
                       </a:r>
-                      <a:endParaRPr lang="en-SG" b="1" dirty="0">
-                        <a:solidFill>
-                          <a:schemeClr val="tx1"/>
-                        </a:solidFill>
-                      </a:endParaRPr>
                     </a:p>
                   </a:txBody>
                   <a:tcPr/>
@@ -3206,7 +3206,7 @@
                   </a:ext>
                 </a:extLst>
               </a:tr>
-              <a:tr h="414648">
+              <a:tr h="914239">
                 <a:tc vMerge="1">
                   <a:txBody>
                     <a:bodyPr/>
@@ -3396,11 +3396,6 @@
                         </a:rPr>
                         <a:t>must complete urgent</a:t>
                       </a:r>
-                      <a:endParaRPr lang="en-SG" b="1" dirty="0">
-                        <a:solidFill>
-                          <a:schemeClr val="tx1"/>
-                        </a:solidFill>
-                      </a:endParaRPr>
                     </a:p>
                   </a:txBody>
                   <a:tcPr/>
@@ -3411,7 +3406,7 @@
                   </a:ext>
                 </a:extLst>
               </a:tr>
-              <a:tr h="963469">
+              <a:tr h="1188511">
                 <a:tc vMerge="1">
                   <a:txBody>
                     <a:bodyPr/>
@@ -3639,11 +3634,6 @@
                         </a:rPr>
                         <a:t>celebrate</a:t>
                       </a:r>
-                      <a:endParaRPr lang="en-SG" b="1" dirty="0">
-                        <a:solidFill>
-                          <a:schemeClr val="tx1"/>
-                        </a:solidFill>
-                      </a:endParaRPr>
                     </a:p>
                   </a:txBody>
                   <a:tcPr/>
@@ -3654,7 +3644,7 @@
                   </a:ext>
                 </a:extLst>
               </a:tr>
-              <a:tr h="352926">
+              <a:tr h="365696">
                 <a:tc>
                   <a:txBody>
                     <a:bodyPr/>
@@ -3721,7 +3711,7 @@
                   </a:ext>
                 </a:extLst>
               </a:tr>
-              <a:tr h="490194">
+              <a:tr h="475400">
                 <a:tc>
                   <a:txBody>
                     <a:bodyPr/>
@@ -3814,11 +3804,6 @@
                         </a:rPr>
                         <a:t>1</a:t>
                       </a:r>
-                      <a:endParaRPr lang="en-SG" b="1" i="0" dirty="0">
-                        <a:solidFill>
-                          <a:schemeClr val="tx1"/>
-                        </a:solidFill>
-                      </a:endParaRPr>
                     </a:p>
                   </a:txBody>
                   <a:tcPr/>
@@ -3829,7 +3814,7 @@
                   </a:ext>
                 </a:extLst>
               </a:tr>
-              <a:tr h="480767">
+              <a:tr h="466258">
                 <a:tc>
                   <a:txBody>
                     <a:bodyPr/>
@@ -3939,11 +3924,6 @@
                         </a:rPr>
                         <a:t>1</a:t>
                       </a:r>
-                      <a:endParaRPr lang="en-SG" b="1" dirty="0">
-                        <a:solidFill>
-                          <a:schemeClr val="tx1"/>
-                        </a:solidFill>
-                      </a:endParaRPr>
                     </a:p>
                   </a:txBody>
                   <a:tcPr/>
@@ -3954,7 +3934,7 @@
                   </a:ext>
                 </a:extLst>
               </a:tr>
-              <a:tr h="810705">
+              <a:tr h="786239">
                 <a:tc>
                   <a:txBody>
                     <a:bodyPr/>
@@ -4120,7 +4100,7 @@
                   </a:ext>
                 </a:extLst>
               </a:tr>
-              <a:tr h="648026">
+              <a:tr h="914239">
                 <a:tc>
                   <a:txBody>
                     <a:bodyPr/>
@@ -4134,11 +4114,6 @@
                         </a:rPr>
                         <a:t>Edit</a:t>
                       </a:r>
-                      <a:endParaRPr lang="en-SG" dirty="0">
-                        <a:solidFill>
-                          <a:schemeClr val="tx1"/>
-                        </a:solidFill>
-                      </a:endParaRPr>
                     </a:p>
                   </a:txBody>
                   <a:tcPr/>
@@ -4297,7 +4272,7 @@
                   </a:ext>
                 </a:extLst>
               </a:tr>
-              <a:tr h="489072">
+              <a:tr h="474312">
                 <a:tc>
                   <a:txBody>
                     <a:bodyPr/>
@@ -4355,7 +4330,7 @@
                   </a:ext>
                 </a:extLst>
               </a:tr>
-              <a:tr h="443586">
+              <a:tr h="430199">
                 <a:tc>
                   <a:txBody>
                     <a:bodyPr/>
@@ -4413,7 +4388,7 @@
                   </a:ext>
                 </a:extLst>
               </a:tr>
-              <a:tr h="305876">
+              <a:tr h="365696">
                 <a:tc rowSpan="3">
                   <a:txBody>
                     <a:bodyPr/>
@@ -4484,7 +4459,7 @@
                   </a:ext>
                 </a:extLst>
               </a:tr>
-              <a:tr h="319004">
+              <a:tr h="365696">
                 <a:tc vMerge="1">
                   <a:txBody>
                     <a:bodyPr/>
@@ -4565,7 +4540,7 @@
                   </a:ext>
                 </a:extLst>
               </a:tr>
-              <a:tr h="404788">
+              <a:tr h="392572">
                 <a:tc vMerge="1">
                   <a:txBody>
                     <a:bodyPr/>
@@ -4646,7 +4621,7 @@
                   </a:ext>
                 </a:extLst>
               </a:tr>
-              <a:tr h="537915">
+              <a:tr h="639967">
                 <a:tc>
                   <a:txBody>
                     <a:bodyPr/>
@@ -4730,6 +4705,24 @@
                           </a:solidFill>
                         </a:rPr>
                         <a:t>data/file.xml</a:t>
+                      </a:r>
+                    </a:p>
+                    <a:p>
+                      <a:r>
+                        <a:rPr lang="en-SG" b="0" baseline="0" dirty="0">
+                          <a:solidFill>
+                            <a:schemeClr val="tx1"/>
+                          </a:solidFill>
+                        </a:rPr>
+                        <a:t>modify </a:t>
+                      </a:r>
+                      <a:r>
+                        <a:rPr lang="en-SG" b="1" baseline="0" dirty="0">
+                          <a:solidFill>
+                            <a:schemeClr val="tx1"/>
+                          </a:solidFill>
+                        </a:rPr>
+                        <a:t>default</a:t>
                       </a:r>
                       <a:endParaRPr lang="en-SG" b="1" dirty="0">
                         <a:solidFill>
@@ -4746,7 +4739,7 @@
                   </a:ext>
                 </a:extLst>
               </a:tr>
-              <a:tr h="484201">
+              <a:tr h="639967">
                 <a:tc>
                   <a:txBody>
                     <a:bodyPr/>
@@ -4779,9 +4772,21 @@
                           <a:ea typeface="+mn-ea"/>
                           <a:cs typeface="+mn-cs"/>
                         </a:rPr>
-                        <a:t>redo</a:t>
-                      </a:r>
-                      <a:endParaRPr lang="en-SG" dirty="0">
+                        <a:t>redo </a:t>
+                      </a:r>
+                      <a:r>
+                        <a:rPr lang="en-SG" sz="1800" b="1" i="0" kern="1200" dirty="0">
+                          <a:solidFill>
+                            <a:schemeClr val="tx1"/>
+                          </a:solidFill>
+                          <a:effectLst/>
+                          <a:latin typeface="+mn-lt"/>
+                          <a:ea typeface="+mn-ea"/>
+                          <a:cs typeface="+mn-cs"/>
+                        </a:rPr>
+                        <a:t>PARAMETERS</a:t>
+                      </a:r>
+                      <a:endParaRPr lang="en-SG" b="1" dirty="0">
                         <a:solidFill>
                           <a:schemeClr val="tx1"/>
                         </a:solidFill>
@@ -4802,6 +4807,16 @@
                           </a:solidFill>
                         </a:rPr>
                         <a:t>redo</a:t>
+                      </a:r>
+                    </a:p>
+                    <a:p>
+                      <a:r>
+                        <a:rPr lang="en-SG" dirty="0">
+                          <a:solidFill>
+                            <a:schemeClr val="tx1"/>
+                          </a:solidFill>
+                        </a:rPr>
+                        <a:t>redo modify</a:t>
                       </a:r>
                     </a:p>
                   </a:txBody>
@@ -4813,7 +4828,145 @@
                   </a:ext>
                 </a:extLst>
               </a:tr>
-              <a:tr h="478556">
+              <a:tr h="469588">
+                <a:tc>
+                  <a:txBody>
+                    <a:bodyPr/>
+                    <a:lstStyle/>
+                    <a:p>
+                      <a:r>
+                        <a:rPr lang="en-SG" dirty="0">
+                          <a:solidFill>
+                            <a:schemeClr val="tx1"/>
+                          </a:solidFill>
+                        </a:rPr>
+                        <a:t>Remind</a:t>
+                      </a:r>
+                    </a:p>
+                  </a:txBody>
+                  <a:tcPr/>
+                </a:tc>
+                <a:tc>
+                  <a:txBody>
+                    <a:bodyPr/>
+                    <a:lstStyle/>
+                    <a:p>
+                      <a:r>
+                        <a:rPr lang="en-SG" dirty="0">
+                          <a:solidFill>
+                            <a:schemeClr val="tx1"/>
+                          </a:solidFill>
+                        </a:rPr>
+                        <a:t>remind </a:t>
+                      </a:r>
+                      <a:r>
+                        <a:rPr lang="en-SG" b="1" dirty="0">
+                          <a:solidFill>
+                            <a:schemeClr val="tx1"/>
+                          </a:solidFill>
+                        </a:rPr>
+                        <a:t>EMAIL</a:t>
+                      </a:r>
+                    </a:p>
+                  </a:txBody>
+                  <a:tcPr/>
+                </a:tc>
+                <a:tc>
+                  <a:txBody>
+                    <a:bodyPr/>
+                    <a:lstStyle/>
+                    <a:p>
+                      <a:r>
+                        <a:rPr lang="en-SG" dirty="0">
+                          <a:solidFill>
+                            <a:schemeClr val="tx1"/>
+                          </a:solidFill>
+                        </a:rPr>
+                        <a:t>remind </a:t>
+                      </a:r>
+                      <a:r>
+                        <a:rPr lang="en-SG" b="1" dirty="0">
+                          <a:solidFill>
+                            <a:schemeClr val="tx1"/>
+                          </a:solidFill>
+                          <a:hlinkClick r:id="rId2"/>
+                        </a:rPr>
+                        <a:t>student@u.nus.edu</a:t>
+                      </a:r>
+                      <a:endParaRPr lang="en-SG" b="1" dirty="0">
+                        <a:solidFill>
+                          <a:schemeClr val="tx1"/>
+                        </a:solidFill>
+                      </a:endParaRPr>
+                    </a:p>
+                  </a:txBody>
+                  <a:tcPr/>
+                </a:tc>
+                <a:extLst>
+                  <a:ext uri="{0D108BD9-81ED-4DB2-BD59-A6C34878D82A}">
+                    <a16:rowId xmlns:a16="http://schemas.microsoft.com/office/drawing/2014/main" val="2720772118"/>
+                  </a:ext>
+                </a:extLst>
+              </a:tr>
+              <a:tr h="469588">
+                <a:tc>
+                  <a:txBody>
+                    <a:bodyPr/>
+                    <a:lstStyle/>
+                    <a:p>
+                      <a:r>
+                        <a:rPr lang="en-SG" dirty="0">
+                          <a:solidFill>
+                            <a:schemeClr val="tx1"/>
+                          </a:solidFill>
+                        </a:rPr>
+                        <a:t>Unremind</a:t>
+                      </a:r>
+                    </a:p>
+                  </a:txBody>
+                  <a:tcPr/>
+                </a:tc>
+                <a:tc>
+                  <a:txBody>
+                    <a:bodyPr/>
+                    <a:lstStyle/>
+                    <a:p>
+                      <a:r>
+                        <a:rPr lang="en-SG" dirty="0">
+                          <a:solidFill>
+                            <a:schemeClr val="tx1"/>
+                          </a:solidFill>
+                        </a:rPr>
+                        <a:t>unremind</a:t>
+                      </a:r>
+                    </a:p>
+                  </a:txBody>
+                  <a:tcPr/>
+                </a:tc>
+                <a:tc>
+                  <a:txBody>
+                    <a:bodyPr/>
+                    <a:lstStyle/>
+                    <a:p>
+                      <a:r>
+                        <a:rPr lang="en-SG" dirty="0">
+                          <a:solidFill>
+                            <a:schemeClr val="tx1"/>
+                          </a:solidFill>
+                        </a:rPr>
+                        <a:t>unremind</a:t>
+                      </a:r>
+                    </a:p>
+                  </a:txBody>
+                  <a:tcPr/>
+                </a:tc>
+                <a:extLst>
+                  <a:ext uri="{0D108BD9-81ED-4DB2-BD59-A6C34878D82A}">
+                    <a16:rowId xmlns:a16="http://schemas.microsoft.com/office/drawing/2014/main" val="851714347"/>
+                  </a:ext>
+                </a:extLst>
+              </a:tr>
+              <a:tr h="464113">
                 <a:tc>
                   <a:txBody>
                     <a:bodyPr/>
@@ -4928,7 +5081,7 @@
                   </a:ext>
                 </a:extLst>
               </a:tr>
-              <a:tr h="648026">
+              <a:tr h="639967">
                 <a:tc>
                   <a:txBody>
                     <a:bodyPr/>
@@ -4961,9 +5114,21 @@
                           <a:ea typeface="+mn-ea"/>
                           <a:cs typeface="+mn-cs"/>
                         </a:rPr>
-                        <a:t>undo</a:t>
-                      </a:r>
-                      <a:endParaRPr lang="en-SG" dirty="0">
+                        <a:t>undo </a:t>
+                      </a:r>
+                      <a:r>
+                        <a:rPr lang="en-SG" sz="1800" b="1" i="0" kern="1200" dirty="0">
+                          <a:solidFill>
+                            <a:schemeClr val="tx1"/>
+                          </a:solidFill>
+                          <a:effectLst/>
+                          <a:latin typeface="+mn-lt"/>
+                          <a:ea typeface="+mn-ea"/>
+                          <a:cs typeface="+mn-cs"/>
+                        </a:rPr>
+                        <a:t>PARAMETERS</a:t>
+                      </a:r>
+                      <a:endParaRPr lang="en-SG" b="1" dirty="0">
                         <a:solidFill>
                           <a:schemeClr val="tx1"/>
                         </a:solidFill>
@@ -4984,6 +5149,16 @@
                           </a:solidFill>
                         </a:rPr>
                         <a:t>undo</a:t>
+                      </a:r>
+                    </a:p>
+                    <a:p>
+                      <a:r>
+                        <a:rPr lang="en-SG" dirty="0">
+                          <a:solidFill>
+                            <a:schemeClr val="tx1"/>
+                          </a:solidFill>
+                        </a:rPr>
+                        <a:t>undo modify</a:t>
                       </a:r>
                     </a:p>
                   </a:txBody>

</xml_diff>